<commit_message>
working on Lessons through 2.3
</commit_message>
<xml_diff>
--- a/Slides/Lesson 0.3 Academic Honesty.pptx
+++ b/Slides/Lesson 0.3 Academic Honesty.pptx
@@ -10837,30 +10837,32 @@
           <a:prstGeom prst="rect">
             <a:avLst/>
           </a:prstGeom>
-          <a:noFill/>
-          <a:ln>
-            <a:noFill/>
+          <a:ln w="28575">
+            <a:solidFill>
+              <a:schemeClr val="accent1"/>
+            </a:solidFill>
           </a:ln>
         </p:spPr>
         <p:txBody>
-          <a:bodyPr lIns="91425" tIns="45700" rIns="91425" bIns="45700" anchor="ctr" anchorCtr="0">
-            <a:noAutofit/>
+          <a:bodyPr vert="horz" lIns="91440" tIns="45720" rIns="91440" bIns="45720" rtlCol="0" anchor="ctr">
+            <a:normAutofit/>
           </a:bodyPr>
           <a:lstStyle/>
           <a:p>
-            <a:pPr marL="0" marR="0" lvl="0" indent="0" algn="ctr" rtl="0">
+            <a:pPr>
               <a:spcBef>
-                <a:spcPts val="0"/>
+                <a:spcPct val="0"/>
               </a:spcBef>
-              <a:buClr>
-                <a:schemeClr val="dk1"/>
-              </a:buClr>
-              <a:buSzPct val="25000"/>
-              <a:buFont typeface="Calibri"/>
-              <a:buNone/>
             </a:pPr>
             <a:r>
-              <a:rPr lang="en"/>
+              <a:rPr lang="en" kern="1200">
+                <a:solidFill>
+                  <a:schemeClr val="tx1"/>
+                </a:solidFill>
+                <a:latin typeface="+mj-lt"/>
+                <a:ea typeface="+mj-ea"/>
+                <a:cs typeface="+mj-cs"/>
+              </a:rPr>
               <a:t>Academic Honesty</a:t>
             </a:r>
           </a:p>

</xml_diff>